<commit_message>
Just small corrections on analysis
</commit_message>
<xml_diff>
--- a/src/Analysis/AnalysisAndReadMe.pptx
+++ b/src/Analysis/AnalysisAndReadMe.pptx
@@ -3716,7 +3716,7 @@
               <a:rPr lang="en-US" dirty="0">
                 <a:effectLst/>
               </a:rPr>
-              <a:t>In it´s main() the Controller creates all the objects, sets itself as an observer of Input and sets View as an observer of </a:t>
+              <a:t>In its main() the Controller creates all the objects, sets itself as an observer of Input and sets View as an observer of </a:t>
             </a:r>
             <a:r>
               <a:rPr lang="en-US" dirty="0" err="1">
@@ -3771,7 +3771,15 @@
             </a:r>
             <a:r>
               <a:rPr lang="en-US" dirty="0"/>
-              <a:t>rom the Player and notifies it´s observers (the Controller).</a:t>
+              <a:t>rom the Player and </a:t>
+            </a:r>
+            <a:r>
+              <a:rPr lang="en-US"/>
+              <a:t>notifies its </a:t>
+            </a:r>
+            <a:r>
+              <a:rPr lang="en-US" dirty="0"/>
+              <a:t>observers (the Controller).</a:t>
             </a:r>
             <a:endParaRPr lang="en-US" dirty="0">
               <a:effectLst/>
@@ -3797,7 +3805,7 @@
             </a:r>
             <a:r>
               <a:rPr lang="en-US" dirty="0"/>
-              <a:t>In it´s update()</a:t>
+              <a:t>In its update()</a:t>
             </a:r>
             <a:r>
               <a:rPr lang="en-US" dirty="0">
@@ -3876,7 +3884,7 @@
               <a:rPr lang="en-US" dirty="0">
                 <a:effectLst/>
               </a:rPr>
-              <a:t> handles the movement and notifies it´s observers (the View).</a:t>
+              <a:t> handles the movement and notifies its observers (the View).</a:t>
             </a:r>
           </a:p>
           <a:p>
@@ -3891,7 +3899,7 @@
             </a:r>
             <a:r>
               <a:rPr lang="es-ES" dirty="0" err="1"/>
-              <a:t>it´s</a:t>
+              <a:t>its</a:t>
             </a:r>
             <a:r>
               <a:rPr lang="es-ES" dirty="0"/>

</xml_diff>